<commit_message>
Roman to numbers #13 Leetcode is solved
</commit_message>
<xml_diff>
--- a/Arrays & Strings/#2.pptx
+++ b/Arrays & Strings/#2.pptx
@@ -3557,7 +3557,7 @@
                   </a:outerShdw>
                 </a:effectLst>
               </a:rPr>
-              <a:t>  #56</a:t>
+              <a:t>  #13</a:t>
             </a:r>
             <a:br>
               <a:rPr lang="en-US" sz="6600" b="1" dirty="0">
@@ -3587,9 +3587,9 @@
                 </a:effectLst>
                 <a:sym typeface="+mn-ea"/>
               </a:rPr>
-              <a:t>Merge Intervals</a:t>
-            </a:r>
-            <a:endParaRPr lang="en-US" altLang="ko-KR" sz="6600" b="1" dirty="0">
+              <a:t>Roman to Integer</a:t>
+            </a:r>
+            <a:endParaRPr lang="en-US" altLang="ko-KR" sz="6600" b="1">
               <a:solidFill>
                 <a:schemeClr val="accent1"/>
               </a:solidFill>
@@ -3643,7 +3643,7 @@
           <a:p>
             <a:r>
               <a:rPr lang="en-US"/>
-              <a:t>2025-01-09</a:t>
+              <a:t>2025-01-16</a:t>
             </a:r>
             <a:endParaRPr lang="en-US" dirty="0"/>
           </a:p>
@@ -3806,7 +3806,7 @@
             <a:r>
               <a:rPr lang="en-US" altLang="ko-KR" b="1">
                 <a:solidFill>
-                  <a:schemeClr val="accent4"/>
+                  <a:srgbClr val="00B050"/>
                 </a:solidFill>
                 <a:effectLst>
                   <a:outerShdw blurRad="38100" dist="25400" dir="5400000" algn="ctr" rotWithShape="0">
@@ -3816,7 +3816,7 @@
                   </a:outerShdw>
                 </a:effectLst>
               </a:rPr>
-              <a:t>medium</a:t>
+              <a:t>easy</a:t>
             </a:r>
             <a:endParaRPr lang="en-US" altLang="ko-KR"/>
           </a:p>
@@ -3838,7 +3838,7 @@
                   </a:outerShdw>
                 </a:effectLst>
               </a:rPr>
-              <a:t>Arrays</a:t>
+              <a:t>Hashmaps</a:t>
             </a:r>
             <a:endParaRPr lang="en-US" altLang="ko-KR" b="1" dirty="0">
               <a:solidFill>
@@ -3929,7 +3929,7 @@
       </p:sp>
       <p:pic>
         <p:nvPicPr>
-          <p:cNvPr id="9" name="Picture 8"/>
+          <p:cNvPr id="3" name="Picture 2"/>
           <p:cNvPicPr>
             <a:picLocks noChangeAspect="1"/>
           </p:cNvPicPr>
@@ -3937,28 +3937,32 @@
         </p:nvPicPr>
         <p:blipFill>
           <a:blip r:embed="rId1"/>
+          <a:srcRect r="28810" b="48228"/>
           <a:stretch>
             <a:fillRect/>
           </a:stretch>
         </p:blipFill>
         <p:spPr>
           <a:xfrm>
-            <a:off x="1826895" y="1494790"/>
-            <a:ext cx="8724900" cy="1743075"/>
+            <a:off x="562610" y="1691005"/>
+            <a:ext cx="6346190" cy="3208655"/>
           </a:xfrm>
           <a:prstGeom prst="rect">
             <a:avLst/>
           </a:prstGeom>
-          <a:ln w="38100">
+          <a:ln w="28575" cmpd="sng">
             <a:solidFill>
-              <a:schemeClr val="accent1"/>
+              <a:schemeClr val="accent1">
+                <a:shade val="50000"/>
+              </a:schemeClr>
             </a:solidFill>
+            <a:prstDash val="solid"/>
           </a:ln>
         </p:spPr>
       </p:pic>
       <p:pic>
         <p:nvPicPr>
-          <p:cNvPr id="10" name="Picture 9"/>
+          <p:cNvPr id="5" name="Picture 4"/>
           <p:cNvPicPr>
             <a:picLocks noChangeAspect="1"/>
           </p:cNvPicPr>
@@ -3972,22 +3976,23 @@
         </p:blipFill>
         <p:spPr>
           <a:xfrm>
-            <a:off x="656590" y="4047490"/>
-            <a:ext cx="7105650" cy="2257425"/>
+            <a:off x="7145020" y="1691005"/>
+            <a:ext cx="4523105" cy="1325245"/>
           </a:xfrm>
           <a:prstGeom prst="rect">
             <a:avLst/>
           </a:prstGeom>
-          <a:ln w="31750">
+          <a:ln w="28575" cmpd="sng">
             <a:solidFill>
-              <a:schemeClr val="accent4"/>
+              <a:srgbClr val="FFC000"/>
             </a:solidFill>
+            <a:prstDash val="solid"/>
           </a:ln>
         </p:spPr>
       </p:pic>
       <p:pic>
         <p:nvPicPr>
-          <p:cNvPr id="11" name="Picture 10"/>
+          <p:cNvPr id="6" name="Picture 5"/>
           <p:cNvPicPr>
             <a:picLocks noChangeAspect="1"/>
           </p:cNvPicPr>
@@ -4001,15 +4006,15 @@
         </p:blipFill>
         <p:spPr>
           <a:xfrm>
-            <a:off x="8524875" y="4353560"/>
-            <a:ext cx="2828925" cy="1466850"/>
+            <a:off x="7298055" y="3242310"/>
+            <a:ext cx="4216400" cy="2869565"/>
           </a:xfrm>
           <a:prstGeom prst="rect">
             <a:avLst/>
           </a:prstGeom>
-          <a:ln w="38100" cmpd="sng">
+          <a:ln w="28575" cmpd="sng">
             <a:solidFill>
-              <a:srgbClr val="FF0000"/>
+              <a:srgbClr val="00B050"/>
             </a:solidFill>
             <a:prstDash val="solid"/>
           </a:ln>
@@ -4042,6 +4047,53 @@
       </p:grpSpPr>
       <p:sp>
         <p:nvSpPr>
+          <p:cNvPr id="38" name="Rounded Rectangle 37"/>
+          <p:cNvSpPr/>
+          <p:nvPr/>
+        </p:nvSpPr>
+        <p:spPr>
+          <a:xfrm>
+            <a:off x="4067175" y="4019550"/>
+            <a:ext cx="2238375" cy="1219200"/>
+          </a:xfrm>
+          <a:prstGeom prst="roundRect">
+            <a:avLst/>
+          </a:prstGeom>
+          <a:solidFill>
+            <a:schemeClr val="accent6">
+              <a:alpha val="53000"/>
+            </a:schemeClr>
+          </a:solidFill>
+          <a:ln>
+            <a:noFill/>
+          </a:ln>
+        </p:spPr>
+        <p:style>
+          <a:lnRef idx="2">
+            <a:schemeClr val="accent1">
+              <a:lumMod val="75000"/>
+            </a:schemeClr>
+          </a:lnRef>
+          <a:fillRef idx="1">
+            <a:schemeClr val="accent1"/>
+          </a:fillRef>
+          <a:effectRef idx="0">
+            <a:srgbClr val="FFFFFF"/>
+          </a:effectRef>
+          <a:fontRef idx="minor">
+            <a:schemeClr val="lt1"/>
+          </a:fontRef>
+        </p:style>
+        <p:txBody>
+          <a:bodyPr rtlCol="0" anchor="ctr"/>
+          <a:p>
+            <a:pPr algn="ctr"/>
+            <a:endParaRPr lang="en-US"/>
+          </a:p>
+        </p:txBody>
+      </p:sp>
+      <p:sp>
+        <p:nvSpPr>
           <p:cNvPr id="2" name="제목 1"/>
           <p:cNvSpPr>
             <a:spLocks noGrp="1"/>
@@ -4068,471 +4120,133 @@
           </a:p>
         </p:txBody>
       </p:sp>
-      <p:cxnSp>
-        <p:nvCxnSpPr>
-          <p:cNvPr id="4" name="Straight Arrow Connector 3"/>
-          <p:cNvCxnSpPr/>
+      <p:pic>
+        <p:nvPicPr>
+          <p:cNvPr id="3" name="Picture 2"/>
+          <p:cNvPicPr>
+            <a:picLocks noChangeAspect="1"/>
+          </p:cNvPicPr>
           <p:nvPr/>
-        </p:nvCxnSpPr>
+        </p:nvPicPr>
+        <p:blipFill>
+          <a:blip r:embed="rId1"/>
+          <a:srcRect t="17566"/>
+          <a:stretch>
+            <a:fillRect/>
+          </a:stretch>
+        </p:blipFill>
         <p:spPr>
           <a:xfrm>
-            <a:off x="2497455" y="5661025"/>
-            <a:ext cx="7456170" cy="15240"/>
+            <a:off x="8221345" y="2853690"/>
+            <a:ext cx="3221990" cy="2976880"/>
           </a:xfrm>
-          <a:prstGeom prst="straightConnector1">
+          <a:prstGeom prst="rect">
             <a:avLst/>
           </a:prstGeom>
-          <a:ln w="34925">
+          <a:ln w="28575" cmpd="sng">
+            <a:solidFill>
+              <a:srgbClr val="FFC000"/>
+            </a:solidFill>
+            <a:prstDash val="sysDot"/>
+          </a:ln>
+        </p:spPr>
+      </p:pic>
+      <p:pic>
+        <p:nvPicPr>
+          <p:cNvPr id="5" name="Picture 4"/>
+          <p:cNvPicPr>
+            <a:picLocks noChangeAspect="1"/>
+          </p:cNvPicPr>
+          <p:nvPr/>
+        </p:nvPicPr>
+        <p:blipFill>
+          <a:blip r:embed="rId1"/>
+          <a:srcRect l="65291" t="5696" r="8992" b="85525"/>
+          <a:stretch>
+            <a:fillRect/>
+          </a:stretch>
+        </p:blipFill>
+        <p:spPr>
+          <a:xfrm>
+            <a:off x="9272270" y="1548765"/>
+            <a:ext cx="1271270" cy="486410"/>
+          </a:xfrm>
+          <a:prstGeom prst="roundRect">
+            <a:avLst/>
+          </a:prstGeom>
+          <a:ln w="38100">
             <a:solidFill>
               <a:srgbClr val="FF0000"/>
             </a:solidFill>
-            <a:headEnd type="arrow"/>
-            <a:tailEnd type="arrow"/>
           </a:ln>
+        </p:spPr>
+      </p:pic>
+      <p:sp>
+        <p:nvSpPr>
+          <p:cNvPr id="6" name="Down Arrow 5"/>
+          <p:cNvSpPr/>
+          <p:nvPr/>
+        </p:nvSpPr>
+        <p:spPr>
+          <a:xfrm>
+            <a:off x="9744075" y="2235835"/>
+            <a:ext cx="327660" cy="417195"/>
+          </a:xfrm>
+          <a:prstGeom prst="downArrow">
+            <a:avLst/>
+          </a:prstGeom>
+          <a:solidFill>
+            <a:schemeClr val="tx1"/>
+          </a:solidFill>
         </p:spPr>
         <p:style>
           <a:lnRef idx="2">
+            <a:schemeClr val="accent1">
+              <a:lumMod val="75000"/>
+            </a:schemeClr>
+          </a:lnRef>
+          <a:fillRef idx="1">
             <a:schemeClr val="accent1"/>
-          </a:lnRef>
-          <a:fillRef idx="0">
-            <a:srgbClr val="FFFFFF"/>
           </a:fillRef>
           <a:effectRef idx="0">
             <a:srgbClr val="FFFFFF"/>
           </a:effectRef>
           <a:fontRef idx="minor">
-            <a:schemeClr val="tx1"/>
+            <a:schemeClr val="lt1"/>
           </a:fontRef>
         </p:style>
-      </p:cxnSp>
-      <p:sp>
-        <p:nvSpPr>
-          <p:cNvPr id="11" name="Text Box 10"/>
-          <p:cNvSpPr txBox="1"/>
-          <p:nvPr/>
-        </p:nvSpPr>
-        <p:spPr>
-          <a:xfrm>
-            <a:off x="2166620" y="1602105"/>
-            <a:ext cx="7858760" cy="768350"/>
-          </a:xfrm>
-          <a:prstGeom prst="rect">
-            <a:avLst/>
-          </a:prstGeom>
-          <a:noFill/>
-        </p:spPr>
-        <p:txBody>
-          <a:bodyPr wrap="square" rtlCol="0">
-            <a:spAutoFit/>
-          </a:bodyPr>
+        <p:txBody>
+          <a:bodyPr rtlCol="0" anchor="ctr"/>
           <a:p>
             <a:pPr algn="ctr"/>
-            <a:r>
-              <a:rPr lang="en-US" sz="4400"/>
-              <a:t>[1,3]	 </a:t>
-            </a:r>
-            <a:r>
-              <a:rPr lang="en-US" sz="4400">
-                <a:sym typeface="+mn-ea"/>
-              </a:rPr>
-              <a:t>[2,6]	 [7,9]	 [8,10]</a:t>
-            </a:r>
-            <a:r>
-              <a:rPr lang="en-US" sz="2400"/>
-              <a:t> </a:t>
-            </a:r>
-            <a:endParaRPr lang="en-US" sz="2400"/>
-          </a:p>
-        </p:txBody>
-      </p:sp>
-      <p:sp>
-        <p:nvSpPr>
-          <p:cNvPr id="13" name="Text Box 12"/>
-          <p:cNvSpPr txBox="1"/>
-          <p:nvPr/>
-        </p:nvSpPr>
-        <p:spPr>
-          <a:xfrm>
-            <a:off x="2927985" y="2370455"/>
-            <a:ext cx="470535" cy="706755"/>
-          </a:xfrm>
-          <a:prstGeom prst="rect">
-            <a:avLst/>
-          </a:prstGeom>
-          <a:noFill/>
-        </p:spPr>
-        <p:txBody>
-          <a:bodyPr wrap="square" rtlCol="0">
-            <a:spAutoFit/>
-          </a:bodyPr>
-          <a:p>
-            <a:r>
-              <a:rPr lang="en-US" sz="4000" b="1">
-                <a:solidFill>
-                  <a:srgbClr val="FF0000"/>
-                </a:solidFill>
-              </a:rPr>
-              <a:t>x</a:t>
-            </a:r>
-            <a:endParaRPr lang="en-US" sz="4000" b="1">
-              <a:solidFill>
-                <a:srgbClr val="FF0000"/>
-              </a:solidFill>
-            </a:endParaRPr>
-          </a:p>
-        </p:txBody>
-      </p:sp>
-      <p:sp>
-        <p:nvSpPr>
-          <p:cNvPr id="30" name="Text Box 29"/>
-          <p:cNvSpPr txBox="1"/>
-          <p:nvPr/>
-        </p:nvSpPr>
-        <p:spPr>
-          <a:xfrm>
-            <a:off x="4931410" y="2370455"/>
-            <a:ext cx="470535" cy="706755"/>
-          </a:xfrm>
-          <a:prstGeom prst="rect">
-            <a:avLst/>
-          </a:prstGeom>
-          <a:noFill/>
-        </p:spPr>
-        <p:txBody>
-          <a:bodyPr wrap="square" rtlCol="0">
-            <a:spAutoFit/>
-          </a:bodyPr>
-          <a:p>
-            <a:r>
-              <a:rPr lang="en-US" sz="4000" b="1">
-                <a:solidFill>
-                  <a:srgbClr val="FF0000"/>
-                </a:solidFill>
-              </a:rPr>
-              <a:t>y</a:t>
-            </a:r>
-            <a:endParaRPr lang="en-US" sz="4000" b="1">
-              <a:solidFill>
-                <a:srgbClr val="FF0000"/>
-              </a:solidFill>
-            </a:endParaRPr>
-          </a:p>
-        </p:txBody>
-      </p:sp>
-      <p:sp>
-        <p:nvSpPr>
-          <p:cNvPr id="42" name="Text Box 41"/>
-          <p:cNvSpPr txBox="1"/>
-          <p:nvPr/>
-        </p:nvSpPr>
-        <p:spPr>
-          <a:xfrm>
-            <a:off x="2689860" y="1402715"/>
-            <a:ext cx="906780" cy="368300"/>
-          </a:xfrm>
-          <a:prstGeom prst="rect">
-            <a:avLst/>
-          </a:prstGeom>
-          <a:noFill/>
-        </p:spPr>
-        <p:txBody>
-          <a:bodyPr wrap="square" rtlCol="0">
-            <a:spAutoFit/>
-          </a:bodyPr>
-          <a:p>
-            <a:pPr algn="ctr"/>
-            <a:r>
-              <a:rPr lang="en-US">
-                <a:highlight>
-                  <a:srgbClr val="00FFFF"/>
-                </a:highlight>
-              </a:rPr>
-              <a:t>0 </a:t>
-            </a:r>
-            <a:r>
-              <a:rPr lang="en-US"/>
-              <a:t>    </a:t>
-            </a:r>
-            <a:r>
-              <a:rPr lang="en-US">
-                <a:highlight>
-                  <a:srgbClr val="00FFFF"/>
-                </a:highlight>
-              </a:rPr>
-              <a:t>1</a:t>
-            </a:r>
-            <a:endParaRPr lang="en-US">
-              <a:highlight>
-                <a:srgbClr val="00FFFF"/>
-              </a:highlight>
-            </a:endParaRPr>
-          </a:p>
-        </p:txBody>
-      </p:sp>
-      <p:sp>
-        <p:nvSpPr>
-          <p:cNvPr id="43" name="Text Box 42"/>
-          <p:cNvSpPr txBox="1"/>
-          <p:nvPr/>
-        </p:nvSpPr>
-        <p:spPr>
-          <a:xfrm>
-            <a:off x="4634230" y="1402715"/>
-            <a:ext cx="906780" cy="368300"/>
-          </a:xfrm>
-          <a:prstGeom prst="rect">
-            <a:avLst/>
-          </a:prstGeom>
-          <a:noFill/>
-        </p:spPr>
-        <p:txBody>
-          <a:bodyPr wrap="square" rtlCol="0">
-            <a:spAutoFit/>
-          </a:bodyPr>
-          <a:p>
-            <a:pPr algn="ctr"/>
-            <a:r>
-              <a:rPr lang="en-US">
-                <a:highlight>
-                  <a:srgbClr val="00FFFF"/>
-                </a:highlight>
-              </a:rPr>
-              <a:t>0 </a:t>
-            </a:r>
-            <a:r>
-              <a:rPr lang="en-US"/>
-              <a:t>    </a:t>
-            </a:r>
-            <a:r>
-              <a:rPr lang="en-US">
-                <a:highlight>
-                  <a:srgbClr val="00FFFF"/>
-                </a:highlight>
-              </a:rPr>
-              <a:t>1</a:t>
-            </a:r>
-            <a:endParaRPr lang="en-US">
-              <a:highlight>
-                <a:srgbClr val="00FFFF"/>
-              </a:highlight>
-            </a:endParaRPr>
-          </a:p>
-        </p:txBody>
-      </p:sp>
-      <p:sp>
-        <p:nvSpPr>
-          <p:cNvPr id="44" name="Text Box 43"/>
-          <p:cNvSpPr txBox="1"/>
-          <p:nvPr/>
-        </p:nvSpPr>
-        <p:spPr>
-          <a:xfrm>
-            <a:off x="6451600" y="1402715"/>
-            <a:ext cx="906780" cy="368300"/>
-          </a:xfrm>
-          <a:prstGeom prst="rect">
-            <a:avLst/>
-          </a:prstGeom>
-          <a:noFill/>
-        </p:spPr>
-        <p:txBody>
-          <a:bodyPr wrap="square" rtlCol="0">
-            <a:spAutoFit/>
-          </a:bodyPr>
-          <a:p>
-            <a:pPr algn="ctr"/>
-            <a:r>
-              <a:rPr lang="en-US">
-                <a:highlight>
-                  <a:srgbClr val="00FFFF"/>
-                </a:highlight>
-              </a:rPr>
-              <a:t>0 </a:t>
-            </a:r>
-            <a:r>
-              <a:rPr lang="en-US"/>
-              <a:t>    </a:t>
-            </a:r>
-            <a:r>
-              <a:rPr lang="en-US">
-                <a:highlight>
-                  <a:srgbClr val="00FFFF"/>
-                </a:highlight>
-              </a:rPr>
-              <a:t>1</a:t>
-            </a:r>
-            <a:endParaRPr lang="en-US">
-              <a:highlight>
-                <a:srgbClr val="00FFFF"/>
-              </a:highlight>
-            </a:endParaRPr>
-          </a:p>
-        </p:txBody>
-      </p:sp>
-      <p:sp>
-        <p:nvSpPr>
-          <p:cNvPr id="45" name="Text Box 44"/>
-          <p:cNvSpPr txBox="1"/>
-          <p:nvPr/>
-        </p:nvSpPr>
-        <p:spPr>
-          <a:xfrm>
-            <a:off x="8358505" y="1402715"/>
-            <a:ext cx="935355" cy="368300"/>
-          </a:xfrm>
-          <a:prstGeom prst="rect">
-            <a:avLst/>
-          </a:prstGeom>
-          <a:noFill/>
-        </p:spPr>
-        <p:txBody>
-          <a:bodyPr wrap="square" rtlCol="0">
-            <a:spAutoFit/>
-          </a:bodyPr>
-          <a:p>
-            <a:pPr algn="ctr"/>
-            <a:r>
-              <a:rPr lang="en-US">
-                <a:highlight>
-                  <a:srgbClr val="00FFFF"/>
-                </a:highlight>
-              </a:rPr>
-              <a:t>0 </a:t>
-            </a:r>
-            <a:r>
-              <a:rPr lang="en-US"/>
-              <a:t>         </a:t>
-            </a:r>
-            <a:r>
-              <a:rPr lang="en-US">
-                <a:highlight>
-                  <a:srgbClr val="00FFFF"/>
-                </a:highlight>
-              </a:rPr>
-              <a:t>1</a:t>
-            </a:r>
-            <a:endParaRPr lang="en-US">
-              <a:highlight>
-                <a:srgbClr val="00FFFF"/>
-              </a:highlight>
-            </a:endParaRPr>
+            <a:endParaRPr lang="en-US"/>
           </a:p>
         </p:txBody>
       </p:sp>
       <p:grpSp>
         <p:nvGrpSpPr>
-          <p:cNvPr id="49" name="Group 48"/>
+          <p:cNvPr id="27" name="Group 26"/>
           <p:cNvGrpSpPr/>
           <p:nvPr/>
         </p:nvGrpSpPr>
         <p:grpSpPr>
           <a:xfrm>
-            <a:off x="6859905" y="3368675"/>
-            <a:ext cx="3942080" cy="1104900"/>
-            <a:chOff x="10803" y="5305"/>
-            <a:chExt cx="6208" cy="1740"/>
+            <a:off x="501015" y="1174750"/>
+            <a:ext cx="5523230" cy="1635760"/>
+            <a:chOff x="2468" y="2256"/>
+            <a:chExt cx="8698" cy="2576"/>
           </a:xfrm>
         </p:grpSpPr>
         <p:sp>
           <p:nvSpPr>
-            <p:cNvPr id="40" name="Text Box 39"/>
+            <p:cNvPr id="7" name="Text Box 6"/>
             <p:cNvSpPr txBox="1"/>
             <p:nvPr/>
           </p:nvSpPr>
           <p:spPr>
             <a:xfrm>
-              <a:off x="10803" y="5402"/>
-              <a:ext cx="2226" cy="822"/>
-            </a:xfrm>
-            <a:prstGeom prst="rect">
-              <a:avLst/>
-            </a:prstGeom>
-            <a:noFill/>
-          </p:spPr>
-          <p:txBody>
-            <a:bodyPr wrap="square" rtlCol="0">
-              <a:spAutoFit/>
-            </a:bodyPr>
-            <a:p>
-              <a:r>
-                <a:rPr lang="en-US" sz="2800">
-                  <a:highlight>
-                    <a:srgbClr val="FFFF00"/>
-                  </a:highlight>
-                </a:rPr>
-                <a:t>Overlap:  </a:t>
-              </a:r>
-              <a:endParaRPr lang="en-US" sz="2800">
-                <a:highlight>
-                  <a:srgbClr val="FFFF00"/>
-                </a:highlight>
-              </a:endParaRPr>
-            </a:p>
-          </p:txBody>
-        </p:sp>
-        <p:sp>
-          <p:nvSpPr>
-            <p:cNvPr id="41" name="Text Box 40"/>
-            <p:cNvSpPr txBox="1"/>
-            <p:nvPr/>
-          </p:nvSpPr>
-          <p:spPr>
-            <a:xfrm>
-              <a:off x="13379" y="5305"/>
-              <a:ext cx="3633" cy="919"/>
-            </a:xfrm>
-            <a:prstGeom prst="rect">
-              <a:avLst/>
-            </a:prstGeom>
-            <a:noFill/>
-          </p:spPr>
-          <p:txBody>
-            <a:bodyPr wrap="square" rtlCol="0">
-              <a:spAutoFit/>
-            </a:bodyPr>
-            <a:p>
-              <a:r>
-                <a:rPr lang="en-US" sz="3200" b="1"/>
-                <a:t>x[</a:t>
-              </a:r>
-              <a:r>
-                <a:rPr lang="en-US" sz="3200" b="1">
-                  <a:highlight>
-                    <a:srgbClr val="00FFFF"/>
-                  </a:highlight>
-                </a:rPr>
-                <a:t>1</a:t>
-              </a:r>
-              <a:r>
-                <a:rPr lang="en-US" sz="3200" b="1"/>
-                <a:t>] &lt;= y [</a:t>
-              </a:r>
-              <a:r>
-                <a:rPr lang="en-US" sz="3200" b="1">
-                  <a:highlight>
-                    <a:srgbClr val="00FFFF"/>
-                  </a:highlight>
-                </a:rPr>
-                <a:t>0</a:t>
-              </a:r>
-              <a:r>
-                <a:rPr lang="en-US" sz="3200" b="1"/>
-                <a:t>]</a:t>
-              </a:r>
-              <a:endParaRPr lang="en-US" sz="3200" b="1"/>
-            </a:p>
-          </p:txBody>
-        </p:sp>
-        <p:sp>
-          <p:nvSpPr>
-            <p:cNvPr id="46" name="Text Box 45"/>
-            <p:cNvSpPr txBox="1"/>
-            <p:nvPr/>
-          </p:nvSpPr>
-          <p:spPr>
-            <a:xfrm>
-              <a:off x="11432" y="6321"/>
-              <a:ext cx="4744" cy="725"/>
+              <a:off x="2468" y="2435"/>
+              <a:ext cx="8698" cy="1743"/>
             </a:xfrm>
             <a:prstGeom prst="rect">
               <a:avLst/>
@@ -4546,64 +4260,23 @@
             <a:p>
               <a:pPr algn="ctr"/>
               <a:r>
-                <a:rPr lang="en-US"/>
-                <a:t>This case is </a:t>
+                <a:rPr lang="en-US" sz="6600"/>
+                <a:t>M C M X C I V</a:t>
               </a:r>
-              <a:r>
-                <a:rPr lang="en-US" sz="2400" b="1">
-                  <a:solidFill>
-                    <a:schemeClr val="tx1"/>
-                  </a:solidFill>
-                  <a:effectLst>
-                    <a:outerShdw blurRad="38100" dist="19050" dir="2700000" algn="tl" rotWithShape="0">
-                      <a:schemeClr val="dk1">
-                        <a:alpha val="40000"/>
-                      </a:schemeClr>
-                    </a:outerShdw>
-                  </a:effectLst>
-                </a:rPr>
-                <a:t>overlapping!</a:t>
-              </a:r>
-              <a:endParaRPr lang="en-US" sz="2400" b="1">
-                <a:solidFill>
-                  <a:schemeClr val="tx1"/>
-                </a:solidFill>
-                <a:effectLst>
-                  <a:outerShdw blurRad="38100" dist="19050" dir="2700000" algn="tl" rotWithShape="0">
-                    <a:schemeClr val="dk1">
-                      <a:alpha val="40000"/>
-                    </a:schemeClr>
-                  </a:outerShdw>
-                </a:effectLst>
-              </a:endParaRPr>
+              <a:endParaRPr lang="en-US" sz="6600"/>
             </a:p>
           </p:txBody>
         </p:sp>
-      </p:grpSp>
-      <p:grpSp>
-        <p:nvGrpSpPr>
-          <p:cNvPr id="48" name="Group 47"/>
-          <p:cNvGrpSpPr/>
-          <p:nvPr/>
-        </p:nvGrpSpPr>
-        <p:grpSpPr>
-          <a:xfrm>
-            <a:off x="2292350" y="3368675"/>
-            <a:ext cx="2780030" cy="923290"/>
-            <a:chOff x="3704" y="5071"/>
-            <a:chExt cx="4378" cy="1454"/>
-          </a:xfrm>
-        </p:grpSpPr>
         <p:sp>
           <p:nvSpPr>
-            <p:cNvPr id="37" name="Text Box 36"/>
+            <p:cNvPr id="12" name="Text Box 11"/>
             <p:cNvSpPr txBox="1"/>
             <p:nvPr/>
           </p:nvSpPr>
           <p:spPr>
             <a:xfrm>
-              <a:off x="4236" y="5305"/>
-              <a:ext cx="3633" cy="919"/>
+              <a:off x="3203" y="2256"/>
+              <a:ext cx="1132" cy="580"/>
             </a:xfrm>
             <a:prstGeom prst="rect">
               <a:avLst/>
@@ -4615,79 +4288,601 @@
               <a:spAutoFit/>
             </a:bodyPr>
             <a:p>
+              <a:pPr algn="ctr"/>
               <a:r>
-                <a:rPr lang="en-US" sz="3200" b="1"/>
-                <a:t>x[0] &lt;= y [0]</a:t>
+                <a:rPr lang="en-US" b="1">
+                  <a:ln/>
+                  <a:solidFill>
+                    <a:schemeClr val="accent1"/>
+                  </a:solidFill>
+                  <a:effectLst>
+                    <a:outerShdw blurRad="38100" dist="25400" dir="5400000" algn="ctr" rotWithShape="0">
+                      <a:srgbClr val="6E747A">
+                        <a:alpha val="43000"/>
+                      </a:srgbClr>
+                    </a:outerShdw>
+                  </a:effectLst>
+                </a:rPr>
+                <a:t>1000</a:t>
               </a:r>
-              <a:endParaRPr lang="en-US" sz="3200" b="1"/>
+              <a:endParaRPr lang="en-US" b="1">
+                <a:ln/>
+                <a:solidFill>
+                  <a:schemeClr val="accent1"/>
+                </a:solidFill>
+                <a:effectLst>
+                  <a:outerShdw blurRad="38100" dist="25400" dir="5400000" algn="ctr" rotWithShape="0">
+                    <a:srgbClr val="6E747A">
+                      <a:alpha val="43000"/>
+                    </a:srgbClr>
+                  </a:outerShdw>
+                </a:effectLst>
+              </a:endParaRPr>
             </a:p>
           </p:txBody>
         </p:sp>
         <p:sp>
           <p:nvSpPr>
-            <p:cNvPr id="47" name="Rectangles 46"/>
-            <p:cNvSpPr/>
+            <p:cNvPr id="14" name="Text Box 13"/>
+            <p:cNvSpPr txBox="1"/>
             <p:nvPr/>
           </p:nvSpPr>
           <p:spPr>
             <a:xfrm>
-              <a:off x="3704" y="5071"/>
-              <a:ext cx="4378" cy="1454"/>
+              <a:off x="5670" y="2256"/>
+              <a:ext cx="1132" cy="580"/>
             </a:xfrm>
             <a:prstGeom prst="rect">
               <a:avLst/>
             </a:prstGeom>
             <a:noFill/>
-            <a:ln w="38100" cmpd="sng">
-              <a:solidFill>
-                <a:srgbClr val="00B050"/>
-              </a:solidFill>
-              <a:prstDash val="solid"/>
-            </a:ln>
           </p:spPr>
-          <p:style>
-            <a:lnRef idx="2">
-              <a:schemeClr val="accent1">
-                <a:lumMod val="75000"/>
-              </a:schemeClr>
-            </a:lnRef>
-            <a:fillRef idx="1">
-              <a:schemeClr val="accent1"/>
-            </a:fillRef>
-            <a:effectRef idx="0">
-              <a:srgbClr val="FFFFFF"/>
-            </a:effectRef>
-            <a:fontRef idx="minor">
-              <a:schemeClr val="lt1"/>
-            </a:fontRef>
-          </p:style>
           <p:txBody>
-            <a:bodyPr rtlCol="0" anchor="ctr"/>
+            <a:bodyPr wrap="square" rtlCol="0">
+              <a:spAutoFit/>
+            </a:bodyPr>
             <a:p>
               <a:pPr algn="ctr"/>
-              <a:endParaRPr lang="en-US"/>
+              <a:r>
+                <a:rPr lang="en-US" b="1">
+                  <a:solidFill>
+                    <a:schemeClr val="accent1"/>
+                  </a:solidFill>
+                  <a:effectLst>
+                    <a:outerShdw blurRad="38100" dist="25400" dir="5400000" algn="ctr" rotWithShape="0">
+                      <a:srgbClr val="6E747A">
+                        <a:alpha val="43000"/>
+                      </a:srgbClr>
+                    </a:outerShdw>
+                  </a:effectLst>
+                </a:rPr>
+                <a:t>1000</a:t>
+              </a:r>
+              <a:endParaRPr lang="en-US" b="1">
+                <a:solidFill>
+                  <a:schemeClr val="accent1"/>
+                </a:solidFill>
+                <a:effectLst>
+                  <a:outerShdw blurRad="38100" dist="25400" dir="5400000" algn="ctr" rotWithShape="0">
+                    <a:srgbClr val="6E747A">
+                      <a:alpha val="43000"/>
+                    </a:srgbClr>
+                  </a:outerShdw>
+                </a:effectLst>
+              </a:endParaRPr>
+            </a:p>
+          </p:txBody>
+        </p:sp>
+        <p:sp>
+          <p:nvSpPr>
+            <p:cNvPr id="15" name="Text Box 14"/>
+            <p:cNvSpPr txBox="1"/>
+            <p:nvPr/>
+          </p:nvSpPr>
+          <p:spPr>
+            <a:xfrm>
+              <a:off x="6902" y="2256"/>
+              <a:ext cx="1132" cy="580"/>
+            </a:xfrm>
+            <a:prstGeom prst="rect">
+              <a:avLst/>
+            </a:prstGeom>
+            <a:noFill/>
+          </p:spPr>
+          <p:txBody>
+            <a:bodyPr wrap="square" rtlCol="0">
+              <a:spAutoFit/>
+            </a:bodyPr>
+            <a:p>
+              <a:pPr algn="ctr"/>
+              <a:r>
+                <a:rPr lang="en-US" b="1">
+                  <a:solidFill>
+                    <a:schemeClr val="accent4"/>
+                  </a:solidFill>
+                  <a:effectLst>
+                    <a:outerShdw blurRad="38100" dist="25400" dir="5400000" algn="ctr" rotWithShape="0">
+                      <a:srgbClr val="6E747A">
+                        <a:alpha val="43000"/>
+                      </a:srgbClr>
+                    </a:outerShdw>
+                  </a:effectLst>
+                </a:rPr>
+                <a:t>10</a:t>
+              </a:r>
+              <a:endParaRPr lang="en-US" b="1">
+                <a:solidFill>
+                  <a:schemeClr val="accent4"/>
+                </a:solidFill>
+                <a:effectLst>
+                  <a:outerShdw blurRad="38100" dist="25400" dir="5400000" algn="ctr" rotWithShape="0">
+                    <a:srgbClr val="6E747A">
+                      <a:alpha val="43000"/>
+                    </a:srgbClr>
+                  </a:outerShdw>
+                </a:effectLst>
+              </a:endParaRPr>
+            </a:p>
+          </p:txBody>
+        </p:sp>
+        <p:sp>
+          <p:nvSpPr>
+            <p:cNvPr id="16" name="Text Box 15"/>
+            <p:cNvSpPr txBox="1"/>
+            <p:nvPr/>
+          </p:nvSpPr>
+          <p:spPr>
+            <a:xfrm>
+              <a:off x="8663" y="2256"/>
+              <a:ext cx="1132" cy="580"/>
+            </a:xfrm>
+            <a:prstGeom prst="rect">
+              <a:avLst/>
+            </a:prstGeom>
+            <a:noFill/>
+          </p:spPr>
+          <p:txBody>
+            <a:bodyPr wrap="square" rtlCol="0">
+              <a:spAutoFit/>
+            </a:bodyPr>
+            <a:p>
+              <a:pPr algn="ctr"/>
+              <a:r>
+                <a:rPr lang="en-US" b="1">
+                  <a:solidFill>
+                    <a:schemeClr val="accent6"/>
+                  </a:solidFill>
+                  <a:effectLst>
+                    <a:outerShdw blurRad="38100" dist="25400" dir="5400000" algn="ctr" rotWithShape="0">
+                      <a:srgbClr val="6E747A">
+                        <a:alpha val="43000"/>
+                      </a:srgbClr>
+                    </a:outerShdw>
+                  </a:effectLst>
+                </a:rPr>
+                <a:t>1</a:t>
+              </a:r>
+              <a:endParaRPr lang="en-US" b="1">
+                <a:solidFill>
+                  <a:schemeClr val="accent6"/>
+                </a:solidFill>
+                <a:effectLst>
+                  <a:outerShdw blurRad="38100" dist="25400" dir="5400000" algn="ctr" rotWithShape="0">
+                    <a:srgbClr val="6E747A">
+                      <a:alpha val="43000"/>
+                    </a:srgbClr>
+                  </a:outerShdw>
+                </a:effectLst>
+              </a:endParaRPr>
+            </a:p>
+          </p:txBody>
+        </p:sp>
+        <p:sp>
+          <p:nvSpPr>
+            <p:cNvPr id="17" name="Text Box 16"/>
+            <p:cNvSpPr txBox="1"/>
+            <p:nvPr/>
+          </p:nvSpPr>
+          <p:spPr>
+            <a:xfrm>
+              <a:off x="9469" y="2256"/>
+              <a:ext cx="1132" cy="580"/>
+            </a:xfrm>
+            <a:prstGeom prst="rect">
+              <a:avLst/>
+            </a:prstGeom>
+            <a:noFill/>
+          </p:spPr>
+          <p:txBody>
+            <a:bodyPr wrap="square" rtlCol="0">
+              <a:spAutoFit/>
+            </a:bodyPr>
+            <a:p>
+              <a:pPr algn="ctr"/>
+              <a:r>
+                <a:rPr lang="en-US" b="1">
+                  <a:solidFill>
+                    <a:srgbClr val="7030A0"/>
+                  </a:solidFill>
+                  <a:effectLst>
+                    <a:outerShdw blurRad="38100" dist="25400" dir="5400000" algn="ctr" rotWithShape="0">
+                      <a:srgbClr val="6E747A">
+                        <a:alpha val="43000"/>
+                      </a:srgbClr>
+                    </a:outerShdw>
+                  </a:effectLst>
+                </a:rPr>
+                <a:t>5</a:t>
+              </a:r>
+              <a:endParaRPr lang="en-US" b="1">
+                <a:solidFill>
+                  <a:srgbClr val="7030A0"/>
+                </a:solidFill>
+                <a:effectLst>
+                  <a:outerShdw blurRad="38100" dist="25400" dir="5400000" algn="ctr" rotWithShape="0">
+                    <a:srgbClr val="6E747A">
+                      <a:alpha val="43000"/>
+                    </a:srgbClr>
+                  </a:outerShdw>
+                </a:effectLst>
+              </a:endParaRPr>
+            </a:p>
+          </p:txBody>
+        </p:sp>
+        <p:sp>
+          <p:nvSpPr>
+            <p:cNvPr id="18" name="Text Box 17"/>
+            <p:cNvSpPr txBox="1"/>
+            <p:nvPr/>
+          </p:nvSpPr>
+          <p:spPr>
+            <a:xfrm>
+              <a:off x="7929" y="2256"/>
+              <a:ext cx="1132" cy="580"/>
+            </a:xfrm>
+            <a:prstGeom prst="rect">
+              <a:avLst/>
+            </a:prstGeom>
+            <a:noFill/>
+          </p:spPr>
+          <p:txBody>
+            <a:bodyPr wrap="square" rtlCol="0">
+              <a:spAutoFit/>
+            </a:bodyPr>
+            <a:p>
+              <a:pPr algn="ctr"/>
+              <a:r>
+                <a:rPr lang="en-US" b="1">
+                  <a:solidFill>
+                    <a:schemeClr val="accent2"/>
+                  </a:solidFill>
+                  <a:effectLst>
+                    <a:outerShdw blurRad="38100" dist="25400" dir="5400000" algn="ctr" rotWithShape="0">
+                      <a:srgbClr val="6E747A">
+                        <a:alpha val="43000"/>
+                      </a:srgbClr>
+                    </a:outerShdw>
+                  </a:effectLst>
+                </a:rPr>
+                <a:t>100</a:t>
+              </a:r>
+              <a:endParaRPr lang="en-US" b="1">
+                <a:solidFill>
+                  <a:schemeClr val="accent2"/>
+                </a:solidFill>
+                <a:effectLst>
+                  <a:outerShdw blurRad="38100" dist="25400" dir="5400000" algn="ctr" rotWithShape="0">
+                    <a:srgbClr val="6E747A">
+                      <a:alpha val="43000"/>
+                    </a:srgbClr>
+                  </a:outerShdw>
+                </a:effectLst>
+              </a:endParaRPr>
+            </a:p>
+          </p:txBody>
+        </p:sp>
+        <p:sp>
+          <p:nvSpPr>
+            <p:cNvPr id="19" name="Text Box 18"/>
+            <p:cNvSpPr txBox="1"/>
+            <p:nvPr/>
+          </p:nvSpPr>
+          <p:spPr>
+            <a:xfrm>
+              <a:off x="4438" y="2256"/>
+              <a:ext cx="1132" cy="580"/>
+            </a:xfrm>
+            <a:prstGeom prst="rect">
+              <a:avLst/>
+            </a:prstGeom>
+            <a:noFill/>
+          </p:spPr>
+          <p:txBody>
+            <a:bodyPr wrap="square" rtlCol="0">
+              <a:spAutoFit/>
+            </a:bodyPr>
+            <a:p>
+              <a:pPr algn="ctr"/>
+              <a:r>
+                <a:rPr lang="en-US" b="1">
+                  <a:solidFill>
+                    <a:schemeClr val="accent2"/>
+                  </a:solidFill>
+                  <a:effectLst>
+                    <a:outerShdw blurRad="38100" dist="25400" dir="5400000" algn="ctr" rotWithShape="0">
+                      <a:srgbClr val="6E747A">
+                        <a:alpha val="43000"/>
+                      </a:srgbClr>
+                    </a:outerShdw>
+                  </a:effectLst>
+                </a:rPr>
+                <a:t>100</a:t>
+              </a:r>
+              <a:endParaRPr lang="en-US" b="1">
+                <a:solidFill>
+                  <a:schemeClr val="accent2"/>
+                </a:solidFill>
+                <a:effectLst>
+                  <a:outerShdw blurRad="38100" dist="25400" dir="5400000" algn="ctr" rotWithShape="0">
+                    <a:srgbClr val="6E747A">
+                      <a:alpha val="43000"/>
+                    </a:srgbClr>
+                  </a:outerShdw>
+                </a:effectLst>
+              </a:endParaRPr>
+            </a:p>
+          </p:txBody>
+        </p:sp>
+        <p:sp>
+          <p:nvSpPr>
+            <p:cNvPr id="20" name="Text Box 19"/>
+            <p:cNvSpPr txBox="1"/>
+            <p:nvPr/>
+          </p:nvSpPr>
+          <p:spPr>
+            <a:xfrm>
+              <a:off x="3385" y="3914"/>
+              <a:ext cx="657" cy="919"/>
+            </a:xfrm>
+            <a:prstGeom prst="rect">
+              <a:avLst/>
+            </a:prstGeom>
+            <a:noFill/>
+          </p:spPr>
+          <p:txBody>
+            <a:bodyPr wrap="square" rtlCol="0">
+              <a:spAutoFit/>
+            </a:bodyPr>
+            <a:p>
+              <a:pPr algn="ctr"/>
+              <a:r>
+                <a:rPr lang="en-US" sz="3200" b="1">
+                  <a:solidFill>
+                    <a:srgbClr val="FF0000"/>
+                  </a:solidFill>
+                </a:rPr>
+                <a:t>i</a:t>
+              </a:r>
+              <a:endParaRPr lang="en-US" sz="3200" b="1">
+                <a:solidFill>
+                  <a:srgbClr val="FF0000"/>
+                </a:solidFill>
+              </a:endParaRPr>
+            </a:p>
+          </p:txBody>
+        </p:sp>
+        <p:sp>
+          <p:nvSpPr>
+            <p:cNvPr id="21" name="Text Box 20"/>
+            <p:cNvSpPr txBox="1"/>
+            <p:nvPr/>
+          </p:nvSpPr>
+          <p:spPr>
+            <a:xfrm>
+              <a:off x="4421" y="3914"/>
+              <a:ext cx="1248" cy="919"/>
+            </a:xfrm>
+            <a:prstGeom prst="rect">
+              <a:avLst/>
+            </a:prstGeom>
+            <a:noFill/>
+          </p:spPr>
+          <p:txBody>
+            <a:bodyPr wrap="square" rtlCol="0">
+              <a:spAutoFit/>
+            </a:bodyPr>
+            <a:p>
+              <a:pPr algn="ctr"/>
+              <a:r>
+                <a:rPr lang="en-US" sz="3200" b="1">
+                  <a:solidFill>
+                    <a:srgbClr val="FF0000"/>
+                  </a:solidFill>
+                </a:rPr>
+                <a:t>i+1</a:t>
+              </a:r>
+              <a:endParaRPr lang="en-US" sz="3200" b="1">
+                <a:solidFill>
+                  <a:srgbClr val="FF0000"/>
+                </a:solidFill>
+              </a:endParaRPr>
+            </a:p>
+          </p:txBody>
+        </p:sp>
+        <p:sp>
+          <p:nvSpPr>
+            <p:cNvPr id="22" name="Text Box 21"/>
+            <p:cNvSpPr txBox="1"/>
+            <p:nvPr/>
+          </p:nvSpPr>
+          <p:spPr>
+            <a:xfrm>
+              <a:off x="5603" y="3914"/>
+              <a:ext cx="1094" cy="919"/>
+            </a:xfrm>
+            <a:prstGeom prst="rect">
+              <a:avLst/>
+            </a:prstGeom>
+            <a:noFill/>
+          </p:spPr>
+          <p:txBody>
+            <a:bodyPr wrap="square" rtlCol="0">
+              <a:spAutoFit/>
+            </a:bodyPr>
+            <a:p>
+              <a:pPr algn="ctr"/>
+              <a:r>
+                <a:rPr lang="en-US" sz="3200" b="1">
+                  <a:solidFill>
+                    <a:srgbClr val="FF0000"/>
+                  </a:solidFill>
+                </a:rPr>
+                <a:t>i+2</a:t>
+              </a:r>
+              <a:endParaRPr lang="en-US" sz="3200" b="1">
+                <a:solidFill>
+                  <a:srgbClr val="FF0000"/>
+                </a:solidFill>
+              </a:endParaRPr>
+            </a:p>
+          </p:txBody>
+        </p:sp>
+        <p:sp>
+          <p:nvSpPr>
+            <p:cNvPr id="24" name="Text Box 23"/>
+            <p:cNvSpPr txBox="1"/>
+            <p:nvPr/>
+          </p:nvSpPr>
+          <p:spPr>
+            <a:xfrm>
+              <a:off x="6802" y="3914"/>
+              <a:ext cx="2838" cy="919"/>
+            </a:xfrm>
+            <a:prstGeom prst="rect">
+              <a:avLst/>
+            </a:prstGeom>
+            <a:noFill/>
+          </p:spPr>
+          <p:txBody>
+            <a:bodyPr wrap="square" rtlCol="0">
+              <a:spAutoFit/>
+            </a:bodyPr>
+            <a:p>
+              <a:pPr algn="ctr"/>
+              <a:r>
+                <a:rPr lang="en-US" sz="3200" b="1">
+                  <a:solidFill>
+                    <a:srgbClr val="FF0000"/>
+                  </a:solidFill>
+                </a:rPr>
+                <a:t>...............</a:t>
+              </a:r>
+              <a:endParaRPr lang="en-US" sz="3200" b="1">
+                <a:solidFill>
+                  <a:srgbClr val="FF0000"/>
+                </a:solidFill>
+              </a:endParaRPr>
+            </a:p>
+          </p:txBody>
+        </p:sp>
+        <p:sp>
+          <p:nvSpPr>
+            <p:cNvPr id="25" name="Text Box 24"/>
+            <p:cNvSpPr txBox="1"/>
+            <p:nvPr/>
+          </p:nvSpPr>
+          <p:spPr>
+            <a:xfrm>
+              <a:off x="9469" y="3914"/>
+              <a:ext cx="1296" cy="919"/>
+            </a:xfrm>
+            <a:prstGeom prst="rect">
+              <a:avLst/>
+            </a:prstGeom>
+            <a:noFill/>
+          </p:spPr>
+          <p:txBody>
+            <a:bodyPr wrap="square" rtlCol="0">
+              <a:spAutoFit/>
+            </a:bodyPr>
+            <a:p>
+              <a:pPr algn="ctr"/>
+              <a:r>
+                <a:rPr lang="en-US" sz="3200" b="1">
+                  <a:solidFill>
+                    <a:srgbClr val="FF0000"/>
+                  </a:solidFill>
+                </a:rPr>
+                <a:t>i+n</a:t>
+              </a:r>
+              <a:endParaRPr lang="en-US" sz="3200" b="1">
+                <a:solidFill>
+                  <a:srgbClr val="FF0000"/>
+                </a:solidFill>
+              </a:endParaRPr>
             </a:p>
           </p:txBody>
         </p:sp>
       </p:grpSp>
       <p:sp>
         <p:nvSpPr>
-          <p:cNvPr id="50" name="Rounded Rectangle 49"/>
-          <p:cNvSpPr/>
+          <p:cNvPr id="26" name="Text Box 25"/>
+          <p:cNvSpPr txBox="1"/>
           <p:nvPr/>
         </p:nvSpPr>
         <p:spPr>
           <a:xfrm>
-            <a:off x="6710680" y="3169920"/>
-            <a:ext cx="4130040" cy="1578610"/>
+            <a:off x="5774690" y="2320290"/>
+            <a:ext cx="2955925" cy="398780"/>
           </a:xfrm>
-          <a:prstGeom prst="roundRect">
+          <a:prstGeom prst="rect">
             <a:avLst/>
           </a:prstGeom>
           <a:noFill/>
-          <a:ln w="41275" cmpd="sng">
+        </p:spPr>
+        <p:txBody>
+          <a:bodyPr wrap="square" rtlCol="0">
+            <a:spAutoFit/>
+          </a:bodyPr>
+          <a:p>
+            <a:r>
+              <a:rPr lang="en-US" sz="2000" b="1">
+                <a:highlight>
+                  <a:srgbClr val="FFFF00"/>
+                </a:highlight>
+              </a:rPr>
+              <a:t>n</a:t>
+            </a:r>
+            <a:r>
+              <a:rPr lang="en-US" sz="2000"/>
+              <a:t> = </a:t>
+            </a:r>
+            <a:r>
+              <a:rPr lang="en-US" sz="2000" i="1"/>
+              <a:t>Length of string (input)</a:t>
+            </a:r>
+            <a:endParaRPr lang="en-US" sz="2000" i="1"/>
+          </a:p>
+        </p:txBody>
+      </p:sp>
+      <p:sp>
+        <p:nvSpPr>
+          <p:cNvPr id="28" name="Rectangles 27"/>
+          <p:cNvSpPr/>
+          <p:nvPr/>
+        </p:nvSpPr>
+        <p:spPr>
+          <a:xfrm>
+            <a:off x="723900" y="1190625"/>
+            <a:ext cx="5000625" cy="1676400"/>
+          </a:xfrm>
+          <a:prstGeom prst="rect">
+            <a:avLst/>
+          </a:prstGeom>
+          <a:noFill/>
+          <a:ln w="28575" cmpd="sng">
             <a:solidFill>
-              <a:srgbClr val="FF0000"/>
+              <a:srgbClr val="00B050"/>
             </a:solidFill>
             <a:prstDash val="solid"/>
           </a:ln>
@@ -4718,14 +4913,53 @@
       </p:sp>
       <p:sp>
         <p:nvSpPr>
-          <p:cNvPr id="51" name="Text Box 50"/>
+          <p:cNvPr id="29" name="Down Arrow 28"/>
+          <p:cNvSpPr/>
+          <p:nvPr/>
+        </p:nvSpPr>
+        <p:spPr>
+          <a:xfrm>
+            <a:off x="2853055" y="3009900"/>
+            <a:ext cx="400050" cy="504825"/>
+          </a:xfrm>
+          <a:prstGeom prst="downArrow">
+            <a:avLst/>
+          </a:prstGeom>
+        </p:spPr>
+        <p:style>
+          <a:lnRef idx="2">
+            <a:schemeClr val="accent1">
+              <a:lumMod val="75000"/>
+            </a:schemeClr>
+          </a:lnRef>
+          <a:fillRef idx="1">
+            <a:schemeClr val="accent1"/>
+          </a:fillRef>
+          <a:effectRef idx="0">
+            <a:srgbClr val="FFFFFF"/>
+          </a:effectRef>
+          <a:fontRef idx="minor">
+            <a:schemeClr val="lt1"/>
+          </a:fontRef>
+        </p:style>
+        <p:txBody>
+          <a:bodyPr rtlCol="0" anchor="ctr"/>
+          <a:p>
+            <a:pPr algn="ctr"/>
+            <a:endParaRPr lang="en-US"/>
+          </a:p>
+        </p:txBody>
+      </p:sp>
+      <p:sp>
+        <p:nvSpPr>
+          <p:cNvPr id="33" name="Text Box 32"/>
           <p:cNvSpPr txBox="1"/>
           <p:nvPr/>
         </p:nvSpPr>
         <p:spPr>
           <a:xfrm>
-            <a:off x="2564130" y="5787390"/>
-            <a:ext cx="7322820" cy="829945"/>
+            <a:off x="596265" y="4037330"/>
+            <a:ext cx="2174875" cy="1106805"/>
           </a:xfrm>
           <a:prstGeom prst="rect">
             <a:avLst/>
@@ -4733,29 +4967,85 @@
           <a:noFill/>
         </p:spPr>
         <p:txBody>
-          <a:bodyPr wrap="square" rtlCol="0">
+          <a:bodyPr wrap="square" rtlCol="0" anchor="t">
             <a:spAutoFit/>
           </a:bodyPr>
           <a:p>
+            <a:r>
+              <a:rPr lang="en-US" sz="6600">
+                <a:sym typeface="+mn-ea"/>
+              </a:rPr>
+              <a:t>C    M</a:t>
+            </a:r>
+            <a:endParaRPr lang="en-US" sz="6600">
+              <a:sym typeface="+mn-ea"/>
+            </a:endParaRPr>
+          </a:p>
+        </p:txBody>
+      </p:sp>
+      <p:sp>
+        <p:nvSpPr>
+          <p:cNvPr id="34" name="Notched Right Arrow 33"/>
+          <p:cNvSpPr/>
+          <p:nvPr/>
+        </p:nvSpPr>
+        <p:spPr>
+          <a:xfrm>
+            <a:off x="2771140" y="4319270"/>
+            <a:ext cx="733425" cy="542925"/>
+          </a:xfrm>
+          <a:prstGeom prst="notchedRightArrow">
+            <a:avLst/>
+          </a:prstGeom>
+          <a:gradFill>
+            <a:gsLst>
+              <a:gs pos="0">
+                <a:srgbClr val="14CD68"/>
+              </a:gs>
+              <a:gs pos="100000">
+                <a:srgbClr val="035C7D"/>
+              </a:gs>
+            </a:gsLst>
+            <a:lin ang="5400000" scaled="0"/>
+          </a:gradFill>
+          <a:ln>
+            <a:noFill/>
+          </a:ln>
+        </p:spPr>
+        <p:style>
+          <a:lnRef idx="2">
+            <a:schemeClr val="accent1">
+              <a:lumMod val="75000"/>
+            </a:schemeClr>
+          </a:lnRef>
+          <a:fillRef idx="1">
+            <a:schemeClr val="accent1"/>
+          </a:fillRef>
+          <a:effectRef idx="0">
+            <a:srgbClr val="FFFFFF"/>
+          </a:effectRef>
+          <a:fontRef idx="minor">
+            <a:schemeClr val="lt1"/>
+          </a:fontRef>
+        </p:style>
+        <p:txBody>
+          <a:bodyPr rtlCol="0" anchor="ctr"/>
+          <a:p>
             <a:pPr algn="ctr"/>
-            <a:r>
-              <a:rPr lang="en-US" sz="4800"/>
-              <a:t>1  2  3  4  5  6  7  8  9  10 </a:t>
-            </a:r>
-            <a:endParaRPr lang="en-US" sz="4800"/>
-          </a:p>
-        </p:txBody>
-      </p:sp>
-      <p:sp>
-        <p:nvSpPr>
-          <p:cNvPr id="52" name="Text Box 51"/>
+            <a:endParaRPr lang="en-US"/>
+          </a:p>
+        </p:txBody>
+      </p:sp>
+      <p:sp>
+        <p:nvSpPr>
+          <p:cNvPr id="35" name="Text Box 34"/>
           <p:cNvSpPr txBox="1"/>
           <p:nvPr/>
         </p:nvSpPr>
         <p:spPr>
           <a:xfrm>
-            <a:off x="5354955" y="5012055"/>
-            <a:ext cx="1741170" cy="645160"/>
+            <a:off x="501015" y="5024120"/>
+            <a:ext cx="2270125" cy="521970"/>
           </a:xfrm>
           <a:prstGeom prst="rect">
             <a:avLst/>
@@ -4768,10 +5058,63 @@
           </a:bodyPr>
           <a:p>
             <a:r>
-              <a:rPr lang="en-US" sz="3600" b="1"/>
-              <a:t>merged</a:t>
-            </a:r>
-            <a:endParaRPr lang="en-US" sz="3600" b="1"/>
+              <a:rPr lang="en-US" sz="2800" b="1">
+                <a:ln/>
+                <a:solidFill>
+                  <a:schemeClr val="accent1"/>
+                </a:solidFill>
+                <a:effectLst>
+                  <a:outerShdw blurRad="38100" dist="25400" dir="5400000" algn="ctr" rotWithShape="0">
+                    <a:srgbClr val="6E747A">
+                      <a:alpha val="43000"/>
+                    </a:srgbClr>
+                  </a:outerShdw>
+                </a:effectLst>
+              </a:rPr>
+              <a:t>i + 1   &lt;     i + 2      </a:t>
+            </a:r>
+            <a:endParaRPr lang="en-US" sz="2800" b="1">
+              <a:ln/>
+              <a:solidFill>
+                <a:schemeClr val="accent1"/>
+              </a:solidFill>
+              <a:effectLst>
+                <a:outerShdw blurRad="38100" dist="25400" dir="5400000" algn="ctr" rotWithShape="0">
+                  <a:srgbClr val="6E747A">
+                    <a:alpha val="43000"/>
+                  </a:srgbClr>
+                </a:outerShdw>
+              </a:effectLst>
+            </a:endParaRPr>
+          </a:p>
+        </p:txBody>
+      </p:sp>
+      <p:sp>
+        <p:nvSpPr>
+          <p:cNvPr id="36" name="Text Box 35"/>
+          <p:cNvSpPr txBox="1"/>
+          <p:nvPr/>
+        </p:nvSpPr>
+        <p:spPr>
+          <a:xfrm>
+            <a:off x="4191000" y="4037330"/>
+            <a:ext cx="2689860" cy="1106805"/>
+          </a:xfrm>
+          <a:prstGeom prst="rect">
+            <a:avLst/>
+          </a:prstGeom>
+          <a:noFill/>
+        </p:spPr>
+        <p:txBody>
+          <a:bodyPr wrap="square" rtlCol="0">
+            <a:spAutoFit/>
+          </a:bodyPr>
+          <a:p>
+            <a:r>
+              <a:rPr lang="en-US" sz="6600"/>
+              <a:t>M - C</a:t>
+            </a:r>
+            <a:endParaRPr lang="en-US" sz="6600"/>
           </a:p>
         </p:txBody>
       </p:sp>
@@ -4830,7 +5173,7 @@
       </p:sp>
       <p:pic>
         <p:nvPicPr>
-          <p:cNvPr id="5" name="Picture 4"/>
+          <p:cNvPr id="3" name="Picture 2"/>
           <p:cNvPicPr>
             <a:picLocks noChangeAspect="1"/>
           </p:cNvPicPr>
@@ -4844,93 +5187,14 @@
         </p:blipFill>
         <p:spPr>
           <a:xfrm>
-            <a:off x="957580" y="1325880"/>
-            <a:ext cx="8873490" cy="4149090"/>
+            <a:off x="485775" y="1325880"/>
+            <a:ext cx="11220450" cy="4743450"/>
           </a:xfrm>
           <a:prstGeom prst="rect">
             <a:avLst/>
           </a:prstGeom>
         </p:spPr>
       </p:pic>
-      <p:sp>
-        <p:nvSpPr>
-          <p:cNvPr id="7" name="Text Box 6"/>
-          <p:cNvSpPr txBox="1"/>
-          <p:nvPr/>
-        </p:nvSpPr>
-        <p:spPr>
-          <a:xfrm>
-            <a:off x="1071245" y="5474970"/>
-            <a:ext cx="9782175" cy="953135"/>
-          </a:xfrm>
-          <a:prstGeom prst="rect">
-            <a:avLst/>
-          </a:prstGeom>
-          <a:noFill/>
-        </p:spPr>
-        <p:txBody>
-          <a:bodyPr wrap="square" rtlCol="0">
-            <a:spAutoFit/>
-          </a:bodyPr>
-          <a:p>
-            <a:r>
-              <a:rPr lang="en-US" i="1"/>
-              <a:t>lambda</a:t>
-            </a:r>
-            <a:r>
-              <a:rPr lang="en-US"/>
-              <a:t> - to get any of them.</a:t>
-            </a:r>
-            <a:endParaRPr lang="en-US"/>
-          </a:p>
-          <a:p>
-            <a:r>
-              <a:rPr lang="en-US" b="1"/>
-              <a:t>interval[0]:</a:t>
-            </a:r>
-            <a:r>
-              <a:rPr lang="en-US"/>
-              <a:t> I started to sort from starting point</a:t>
-            </a:r>
-            <a:endParaRPr lang="en-US"/>
-          </a:p>
-          <a:p>
-            <a:r>
-              <a:rPr lang="en-US"/>
-              <a:t>I merged all in a new list </a:t>
-            </a:r>
-            <a:r>
-              <a:rPr lang="en-US" sz="2000" b="1"/>
-              <a:t>merged = []</a:t>
-            </a:r>
-            <a:r>
-              <a:rPr lang="en-US"/>
-              <a:t>    -&gt;  </a:t>
-            </a:r>
-            <a:r>
-              <a:rPr lang="en-US" b="1"/>
-              <a:t> merged[-1][-1]</a:t>
-            </a:r>
-            <a:r>
-              <a:rPr lang="en-US"/>
-              <a:t> is to check previus interval in </a:t>
-            </a:r>
-            <a:r>
-              <a:rPr lang="en-US" b="1">
-                <a:highlight>
-                  <a:srgbClr val="00FFFF"/>
-                </a:highlight>
-              </a:rPr>
-              <a:t>merged list</a:t>
-            </a:r>
-            <a:endParaRPr lang="en-US" b="1">
-              <a:highlight>
-                <a:srgbClr val="00FFFF"/>
-              </a:highlight>
-            </a:endParaRPr>
-          </a:p>
-        </p:txBody>
-      </p:sp>
     </p:spTree>
   </p:cSld>
   <p:clrMapOvr>
@@ -4992,7 +5256,7 @@
         </p:nvSpPr>
         <p:spPr>
           <a:xfrm>
-            <a:off x="6807835" y="3723005"/>
+            <a:off x="7009130" y="3723005"/>
             <a:ext cx="656590" cy="495300"/>
           </a:xfrm>
           <a:prstGeom prst="chevron">
@@ -5031,7 +5295,7 @@
       </p:sp>
       <p:pic>
         <p:nvPicPr>
-          <p:cNvPr id="6" name="Picture 5"/>
+          <p:cNvPr id="3" name="Picture 2"/>
           <p:cNvPicPr>
             <a:picLocks noChangeAspect="1"/>
           </p:cNvPicPr>
@@ -5045,13 +5309,13 @@
         </p:blipFill>
         <p:spPr>
           <a:xfrm>
-            <a:off x="8141335" y="2061210"/>
-            <a:ext cx="3038475" cy="3819525"/>
+            <a:off x="8001000" y="2061210"/>
+            <a:ext cx="3352800" cy="3819525"/>
           </a:xfrm>
           <a:prstGeom prst="rect">
             <a:avLst/>
           </a:prstGeom>
-          <a:ln w="41275" cmpd="sng">
+          <a:ln w="47625" cmpd="sng">
             <a:solidFill>
               <a:srgbClr val="00B050"/>
             </a:solidFill>
@@ -5061,7 +5325,7 @@
       </p:pic>
       <p:pic>
         <p:nvPicPr>
-          <p:cNvPr id="7" name="Picture 6"/>
+          <p:cNvPr id="4" name="Picture 3"/>
           <p:cNvPicPr>
             <a:picLocks noChangeAspect="1"/>
           </p:cNvPicPr>
@@ -5075,12 +5339,17 @@
         </p:blipFill>
         <p:spPr>
           <a:xfrm>
-            <a:off x="720725" y="977265"/>
-            <a:ext cx="5475605" cy="5680710"/>
+            <a:off x="309245" y="1893570"/>
+            <a:ext cx="6365240" cy="4153535"/>
           </a:xfrm>
           <a:prstGeom prst="rect">
             <a:avLst/>
           </a:prstGeom>
+          <a:ln w="47625">
+            <a:solidFill>
+              <a:srgbClr val="FFC000"/>
+            </a:solidFill>
+          </a:ln>
         </p:spPr>
       </p:pic>
     </p:spTree>
@@ -5110,6 +5379,53 @@
       </p:grpSpPr>
       <p:sp>
         <p:nvSpPr>
+          <p:cNvPr id="5" name="Rounded Rectangle 4"/>
+          <p:cNvSpPr/>
+          <p:nvPr/>
+        </p:nvSpPr>
+        <p:spPr>
+          <a:xfrm>
+            <a:off x="971550" y="3724910"/>
+            <a:ext cx="5200650" cy="1466215"/>
+          </a:xfrm>
+          <a:prstGeom prst="roundRect">
+            <a:avLst/>
+          </a:prstGeom>
+          <a:solidFill>
+            <a:srgbClr val="00B0F0">
+              <a:alpha val="44000"/>
+            </a:srgbClr>
+          </a:solidFill>
+          <a:ln>
+            <a:noFill/>
+          </a:ln>
+        </p:spPr>
+        <p:style>
+          <a:lnRef idx="2">
+            <a:schemeClr val="accent1">
+              <a:lumMod val="75000"/>
+            </a:schemeClr>
+          </a:lnRef>
+          <a:fillRef idx="1">
+            <a:schemeClr val="accent1"/>
+          </a:fillRef>
+          <a:effectRef idx="0">
+            <a:srgbClr val="FFFFFF"/>
+          </a:effectRef>
+          <a:fontRef idx="minor">
+            <a:schemeClr val="lt1"/>
+          </a:fontRef>
+        </p:style>
+        <p:txBody>
+          <a:bodyPr rtlCol="0" anchor="ctr"/>
+          <a:p>
+            <a:pPr algn="ctr"/>
+            <a:endParaRPr lang="en-US"/>
+          </a:p>
+        </p:txBody>
+      </p:sp>
+      <p:sp>
+        <p:nvSpPr>
           <p:cNvPr id="2" name="제목 1"/>
           <p:cNvSpPr>
             <a:spLocks noGrp="1"/>
@@ -5143,13 +5459,13 @@
         </p:nvSpPr>
         <p:spPr>
           <a:xfrm>
-            <a:off x="838200" y="1435100"/>
-            <a:ext cx="10808335" cy="2914650"/>
+            <a:off x="838200" y="1600200"/>
+            <a:ext cx="10808335" cy="3590290"/>
           </a:xfrm>
         </p:spPr>
         <p:txBody>
           <a:bodyPr>
-            <a:normAutofit/>
+            <a:normAutofit fontScale="60000"/>
           </a:bodyPr>
           <a:lstStyle/>
           <a:p>
@@ -5161,18 +5477,26 @@
               <a:buChar char=""/>
             </a:pPr>
             <a:r>
-              <a:rPr lang="en-US" b="1">
+              <a:rPr lang="en-US" sz="4700" b="1">
                 <a:highlight>
-                  <a:srgbClr val="FFFF00"/>
+                  <a:srgbClr val="00FFFF"/>
                 </a:highlight>
               </a:rPr>
-              <a:t>Arrays:</a:t>
-            </a:r>
-            <a:r>
-              <a:rPr lang="en-US"/>
+              <a:t>Hashmaps:</a:t>
+            </a:r>
+            <a:r>
+              <a:rPr lang="en-US" sz="4700">
+                <a:highlight>
+                  <a:srgbClr val="00FFFF"/>
+                </a:highlight>
+              </a:rPr>
               <a:t> </a:t>
             </a:r>
-            <a:endParaRPr lang="en-US"/>
+            <a:endParaRPr lang="en-US" sz="4700">
+              <a:highlight>
+                <a:srgbClr val="00FFFF"/>
+              </a:highlight>
+            </a:endParaRPr>
           </a:p>
           <a:p>
             <a:pPr lvl="1" algn="l">
@@ -5183,10 +5507,18 @@
               <a:buChar char="ü"/>
             </a:pPr>
             <a:r>
-              <a:rPr lang="en-US"/>
-              <a:t>I learnt to merge arrays without overlapping </a:t>
-            </a:r>
-            <a:endParaRPr lang="en-US" b="1">
+              <a:rPr lang="en-US" sz="3300"/>
+              <a:t>I learnt to check </a:t>
+            </a:r>
+            <a:r>
+              <a:rPr lang="en-US" sz="3300" b="1"/>
+              <a:t>Hashmap’s elements by its indexe</a:t>
+            </a:r>
+            <a:r>
+              <a:rPr lang="en-US" sz="3300"/>
+              <a:t>s </a:t>
+            </a:r>
+            <a:endParaRPr lang="en-US" sz="3300" b="1">
               <a:solidFill>
                 <a:schemeClr val="tx1"/>
               </a:solidFill>
@@ -5207,7 +5539,7 @@
               <a:buFont typeface="Wingdings" panose="05000000000000000000" charset="0"/>
               <a:buNone/>
             </a:pPr>
-            <a:endParaRPr lang="en-US" b="1">
+            <a:endParaRPr lang="en-US" sz="3300" b="1">
               <a:solidFill>
                 <a:schemeClr val="tx1"/>
               </a:solidFill>
@@ -5229,10 +5561,38 @@
               <a:buChar char="ü"/>
             </a:pPr>
             <a:r>
-              <a:rPr lang="en-US"/>
-              <a:t>And I got how to sorting arrays on interval </a:t>
-            </a:r>
-            <a:endParaRPr lang="en-US"/>
+              <a:rPr lang="en-US" sz="3300"/>
+              <a:t>Understood logic of </a:t>
+            </a:r>
+            <a:r>
+              <a:rPr lang="en-US" sz="3300">
+                <a:ln/>
+                <a:solidFill>
+                  <a:schemeClr val="accent1"/>
+                </a:solidFill>
+                <a:effectLst>
+                  <a:outerShdw blurRad="38100" dist="25400" dir="5400000" algn="ctr" rotWithShape="0">
+                    <a:srgbClr val="6E747A">
+                      <a:alpha val="43000"/>
+                    </a:srgbClr>
+                  </a:outerShdw>
+                </a:effectLst>
+              </a:rPr>
+              <a:t>Roman Numbers</a:t>
+            </a:r>
+            <a:r>
+              <a:rPr lang="en-US" sz="3300"/>
+              <a:t> for </a:t>
+            </a:r>
+            <a:r>
+              <a:rPr lang="en-US" sz="3300" b="1"/>
+              <a:t>CM, IV,  IX, XL</a:t>
+            </a:r>
+            <a:r>
+              <a:rPr lang="en-US" sz="3300"/>
+              <a:t> cases</a:t>
+            </a:r>
+            <a:endParaRPr lang="en-US" sz="3300"/>
           </a:p>
           <a:p>
             <a:pPr lvl="1" algn="l">
@@ -5252,14 +5612,6 @@
               <a:buFont typeface="Wingdings" panose="05000000000000000000" charset="0"/>
               <a:buChar char="ü"/>
             </a:pPr>
-            <a:r>
-              <a:rPr lang="en-US"/>
-              <a:t>I used append() to store all selected intervals in </a:t>
-            </a:r>
-            <a:r>
-              <a:rPr lang="en-US"/>
-              <a:t>a merged list </a:t>
-            </a:r>
             <a:endParaRPr lang="en-US"/>
           </a:p>
           <a:p>
@@ -5280,43 +5632,107 @@
               <a:buFont typeface="Wingdings" panose="05000000000000000000" charset="0"/>
               <a:buChar char="ü"/>
             </a:pPr>
-            <a:endParaRPr lang="en-US"/>
-          </a:p>
-        </p:txBody>
-      </p:sp>
-      <p:sp>
-        <p:nvSpPr>
-          <p:cNvPr id="4" name="Text Box 3"/>
-          <p:cNvSpPr txBox="1"/>
-          <p:nvPr/>
-        </p:nvSpPr>
-        <p:spPr>
-          <a:xfrm>
-            <a:off x="1376045" y="4681855"/>
-            <a:ext cx="7877175" cy="1443990"/>
-          </a:xfrm>
-          <a:prstGeom prst="rect">
-            <a:avLst/>
-          </a:prstGeom>
-          <a:noFill/>
-        </p:spPr>
-        <p:txBody>
-          <a:bodyPr wrap="square" rtlCol="0">
-            <a:noAutofit/>
-          </a:bodyPr>
-          <a:p>
-            <a:r>
-              <a:rPr lang="en-US" sz="2000"/>
-              <a:t>The merged list (merged  = [])  stores at most n intervals in the worst case.</a:t>
-            </a:r>
-            <a:endParaRPr lang="en-US" sz="2000"/>
-          </a:p>
-          <a:p>
-            <a:r>
-              <a:rPr lang="en-US" sz="2000"/>
-              <a:t>so , this is total O(n).</a:t>
-            </a:r>
-            <a:endParaRPr lang="en-US" sz="2000"/>
+            <a:r>
+              <a:rPr lang="en-US">
+                <a:highlight>
+                  <a:srgbClr val="FFFF00"/>
+                </a:highlight>
+              </a:rPr>
+              <a:t>I used  </a:t>
+            </a:r>
+            <a:r>
+              <a:rPr lang="en-US" b="1">
+                <a:highlight>
+                  <a:srgbClr val="FFFF00"/>
+                </a:highlight>
+              </a:rPr>
+              <a:t>n</a:t>
+            </a:r>
+            <a:r>
+              <a:rPr lang="en-US">
+                <a:highlight>
+                  <a:srgbClr val="FFFF00"/>
+                </a:highlight>
+              </a:rPr>
+              <a:t> operators(times) ,</a:t>
+            </a:r>
+            <a:r>
+              <a:rPr lang="en-US"/>
+              <a:t> so ------&gt; </a:t>
+            </a:r>
+            <a:r>
+              <a:rPr lang="en-US" b="1">
+                <a:solidFill>
+                  <a:srgbClr val="FF0000"/>
+                </a:solidFill>
+              </a:rPr>
+              <a:t> time: O(n)</a:t>
+            </a:r>
+            <a:endParaRPr lang="en-US" b="1">
+              <a:solidFill>
+                <a:srgbClr val="FF0000"/>
+              </a:solidFill>
+            </a:endParaRPr>
+          </a:p>
+          <a:p>
+            <a:pPr lvl="1" algn="l">
+              <a:lnSpc>
+                <a:spcPct val="100000"/>
+              </a:lnSpc>
+              <a:buFont typeface="Wingdings" panose="05000000000000000000" charset="0"/>
+              <a:buChar char="ü"/>
+            </a:pPr>
+            <a:endParaRPr lang="en-US"/>
+          </a:p>
+          <a:p>
+            <a:pPr lvl="1" algn="l">
+              <a:lnSpc>
+                <a:spcPct val="100000"/>
+              </a:lnSpc>
+              <a:buFont typeface="Wingdings" panose="05000000000000000000" charset="0"/>
+              <a:buChar char="ü"/>
+            </a:pPr>
+            <a:r>
+              <a:rPr lang="en-US">
+                <a:highlight>
+                  <a:srgbClr val="FFFF00"/>
+                </a:highlight>
+              </a:rPr>
+              <a:t>I  didn’t use space ,</a:t>
+            </a:r>
+            <a:r>
+              <a:rPr lang="en-US"/>
+              <a:t> so -------&gt; </a:t>
+            </a:r>
+            <a:r>
+              <a:rPr lang="en-US" b="1">
+                <a:solidFill>
+                  <a:srgbClr val="FF0000"/>
+                </a:solidFill>
+              </a:rPr>
+              <a:t>space: O(1)</a:t>
+            </a:r>
+            <a:endParaRPr lang="en-US"/>
+          </a:p>
+          <a:p>
+            <a:pPr lvl="1" algn="l">
+              <a:lnSpc>
+                <a:spcPct val="100000"/>
+              </a:lnSpc>
+              <a:buFont typeface="Wingdings" panose="05000000000000000000" charset="0"/>
+              <a:buChar char="ü"/>
+            </a:pPr>
+            <a:endParaRPr lang="en-US"/>
+          </a:p>
+          <a:p>
+            <a:pPr lvl="1" algn="l">
+              <a:lnSpc>
+                <a:spcPct val="100000"/>
+              </a:lnSpc>
+              <a:buFont typeface="Wingdings" panose="05000000000000000000" charset="0"/>
+              <a:buChar char="ü"/>
+            </a:pPr>
+            <a:endParaRPr lang="en-US"/>
           </a:p>
         </p:txBody>
       </p:sp>

</xml_diff>